<commit_message>
Version 2 with catch trials and check screens
</commit_message>
<xml_diff>
--- a/Instructions/instructions.pptx
+++ b/Instructions/instructions.pptx
@@ -5,8 +5,9 @@
     <p:sldMasterId id="2147483648" r:id="rId1"/>
   </p:sldMasterIdLst>
   <p:sldIdLst>
-    <p:sldId id="256" r:id="rId2"/>
-    <p:sldId id="257" r:id="rId3"/>
+    <p:sldId id="258" r:id="rId2"/>
+    <p:sldId id="256" r:id="rId3"/>
+    <p:sldId id="257" r:id="rId4"/>
   </p:sldIdLst>
   <p:sldSz cx="12192000" cy="6858000"/>
   <p:notesSz cx="6858000" cy="9144000"/>
@@ -105,6 +106,11 @@
       </a:defRPr>
     </a:lvl9pPr>
   </p:defaultTextStyle>
+  <p:extLst>
+    <p:ext uri="{EFAFB233-063F-42B5-8137-9DF3F51BA10A}">
+      <p15:sldGuideLst xmlns:p15="http://schemas.microsoft.com/office/powerpoint/2012/main"/>
+    </p:ext>
+  </p:extLst>
 </p:presentation>
 </file>
 
@@ -255,7 +261,7 @@
           <a:p>
             <a:fld id="{3DE4C05A-1505-40BA-83BE-8C79424ECE3C}" type="datetimeFigureOut">
               <a:rPr lang="zh-CN" altLang="en-US" smtClean="0"/>
-              <a:t>2025/7/21</a:t>
+              <a:t>2025/8/6</a:t>
             </a:fld>
             <a:endParaRPr lang="zh-CN" altLang="en-US"/>
           </a:p>
@@ -453,7 +459,7 @@
           <a:p>
             <a:fld id="{3DE4C05A-1505-40BA-83BE-8C79424ECE3C}" type="datetimeFigureOut">
               <a:rPr lang="zh-CN" altLang="en-US" smtClean="0"/>
-              <a:t>2025/7/21</a:t>
+              <a:t>2025/8/6</a:t>
             </a:fld>
             <a:endParaRPr lang="zh-CN" altLang="en-US"/>
           </a:p>
@@ -661,7 +667,7 @@
           <a:p>
             <a:fld id="{3DE4C05A-1505-40BA-83BE-8C79424ECE3C}" type="datetimeFigureOut">
               <a:rPr lang="zh-CN" altLang="en-US" smtClean="0"/>
-              <a:t>2025/7/21</a:t>
+              <a:t>2025/8/6</a:t>
             </a:fld>
             <a:endParaRPr lang="zh-CN" altLang="en-US"/>
           </a:p>
@@ -859,7 +865,7 @@
           <a:p>
             <a:fld id="{3DE4C05A-1505-40BA-83BE-8C79424ECE3C}" type="datetimeFigureOut">
               <a:rPr lang="zh-CN" altLang="en-US" smtClean="0"/>
-              <a:t>2025/7/21</a:t>
+              <a:t>2025/8/6</a:t>
             </a:fld>
             <a:endParaRPr lang="zh-CN" altLang="en-US"/>
           </a:p>
@@ -1134,7 +1140,7 @@
           <a:p>
             <a:fld id="{3DE4C05A-1505-40BA-83BE-8C79424ECE3C}" type="datetimeFigureOut">
               <a:rPr lang="zh-CN" altLang="en-US" smtClean="0"/>
-              <a:t>2025/7/21</a:t>
+              <a:t>2025/8/6</a:t>
             </a:fld>
             <a:endParaRPr lang="zh-CN" altLang="en-US"/>
           </a:p>
@@ -1399,7 +1405,7 @@
           <a:p>
             <a:fld id="{3DE4C05A-1505-40BA-83BE-8C79424ECE3C}" type="datetimeFigureOut">
               <a:rPr lang="zh-CN" altLang="en-US" smtClean="0"/>
-              <a:t>2025/7/21</a:t>
+              <a:t>2025/8/6</a:t>
             </a:fld>
             <a:endParaRPr lang="zh-CN" altLang="en-US"/>
           </a:p>
@@ -1811,7 +1817,7 @@
           <a:p>
             <a:fld id="{3DE4C05A-1505-40BA-83BE-8C79424ECE3C}" type="datetimeFigureOut">
               <a:rPr lang="zh-CN" altLang="en-US" smtClean="0"/>
-              <a:t>2025/7/21</a:t>
+              <a:t>2025/8/6</a:t>
             </a:fld>
             <a:endParaRPr lang="zh-CN" altLang="en-US"/>
           </a:p>
@@ -1952,7 +1958,7 @@
           <a:p>
             <a:fld id="{3DE4C05A-1505-40BA-83BE-8C79424ECE3C}" type="datetimeFigureOut">
               <a:rPr lang="zh-CN" altLang="en-US" smtClean="0"/>
-              <a:t>2025/7/21</a:t>
+              <a:t>2025/8/6</a:t>
             </a:fld>
             <a:endParaRPr lang="zh-CN" altLang="en-US"/>
           </a:p>
@@ -2065,7 +2071,7 @@
           <a:p>
             <a:fld id="{3DE4C05A-1505-40BA-83BE-8C79424ECE3C}" type="datetimeFigureOut">
               <a:rPr lang="zh-CN" altLang="en-US" smtClean="0"/>
-              <a:t>2025/7/21</a:t>
+              <a:t>2025/8/6</a:t>
             </a:fld>
             <a:endParaRPr lang="zh-CN" altLang="en-US"/>
           </a:p>
@@ -2376,7 +2382,7 @@
           <a:p>
             <a:fld id="{3DE4C05A-1505-40BA-83BE-8C79424ECE3C}" type="datetimeFigureOut">
               <a:rPr lang="zh-CN" altLang="en-US" smtClean="0"/>
-              <a:t>2025/7/21</a:t>
+              <a:t>2025/8/6</a:t>
             </a:fld>
             <a:endParaRPr lang="zh-CN" altLang="en-US"/>
           </a:p>
@@ -2664,7 +2670,7 @@
           <a:p>
             <a:fld id="{3DE4C05A-1505-40BA-83BE-8C79424ECE3C}" type="datetimeFigureOut">
               <a:rPr lang="zh-CN" altLang="en-US" smtClean="0"/>
-              <a:t>2025/7/21</a:t>
+              <a:t>2025/8/6</a:t>
             </a:fld>
             <a:endParaRPr lang="zh-CN" altLang="en-US"/>
           </a:p>
@@ -2905,7 +2911,7 @@
           <a:p>
             <a:fld id="{3DE4C05A-1505-40BA-83BE-8C79424ECE3C}" type="datetimeFigureOut">
               <a:rPr lang="zh-CN" altLang="en-US" smtClean="0"/>
-              <a:t>2025/7/21</a:t>
+              <a:t>2025/8/6</a:t>
             </a:fld>
             <a:endParaRPr lang="zh-CN" altLang="en-US"/>
           </a:p>
@@ -3347,6 +3353,84 @@
         </p:nvSpPr>
         <p:spPr>
           <a:xfrm>
+            <a:off x="2091812" y="2875002"/>
+            <a:ext cx="8008375" cy="1107996"/>
+          </a:xfrm>
+          <a:prstGeom prst="rect">
+            <a:avLst/>
+          </a:prstGeom>
+          <a:noFill/>
+        </p:spPr>
+        <p:txBody>
+          <a:bodyPr wrap="square" rtlCol="0">
+            <a:spAutoFit/>
+          </a:bodyPr>
+          <a:lstStyle/>
+          <a:p>
+            <a:pPr algn="ctr"/>
+            <a:r>
+              <a:rPr lang="zh-CN" altLang="en-US" sz="6600" dirty="0"/>
+              <a:t>请等待实验员操作</a:t>
+            </a:r>
+            <a:endParaRPr lang="en-US" altLang="zh-CN" sz="6600" dirty="0"/>
+          </a:p>
+        </p:txBody>
+      </p:sp>
+    </p:spTree>
+    <p:extLst>
+      <p:ext uri="{BB962C8B-B14F-4D97-AF65-F5344CB8AC3E}">
+        <p14:creationId xmlns:p14="http://schemas.microsoft.com/office/powerpoint/2010/main" val="1016098224"/>
+      </p:ext>
+    </p:extLst>
+  </p:cSld>
+  <p:clrMapOvr>
+    <a:masterClrMapping/>
+  </p:clrMapOvr>
+</p:sld>
+</file>
+
+<file path=ppt/slides/slide2.xml><?xml version="1.0" encoding="utf-8"?>
+<p:sld xmlns:a="http://schemas.openxmlformats.org/drawingml/2006/main" xmlns:r="http://schemas.openxmlformats.org/officeDocument/2006/relationships" xmlns:p="http://schemas.openxmlformats.org/presentationml/2006/main">
+  <p:cSld>
+    <p:bg>
+      <p:bgPr>
+        <a:solidFill>
+          <a:schemeClr val="tx1">
+            <a:lumMod val="50000"/>
+            <a:lumOff val="50000"/>
+          </a:schemeClr>
+        </a:solidFill>
+        <a:effectLst/>
+      </p:bgPr>
+    </p:bg>
+    <p:spTree>
+      <p:nvGrpSpPr>
+        <p:cNvPr id="1" name=""/>
+        <p:cNvGrpSpPr/>
+        <p:nvPr/>
+      </p:nvGrpSpPr>
+      <p:grpSpPr>
+        <a:xfrm>
+          <a:off x="0" y="0"/>
+          <a:ext cx="0" cy="0"/>
+          <a:chOff x="0" y="0"/>
+          <a:chExt cx="0" cy="0"/>
+        </a:xfrm>
+      </p:grpSpPr>
+      <p:sp>
+        <p:nvSpPr>
+          <p:cNvPr id="4" name="文本框 3">
+            <a:extLst>
+              <a:ext uri="{FF2B5EF4-FFF2-40B4-BE49-F238E27FC236}">
+                <a16:creationId xmlns:a16="http://schemas.microsoft.com/office/drawing/2014/main" id="{EC51B168-E4E1-76E2-2E5F-19CA932D5D65}"/>
+              </a:ext>
+            </a:extLst>
+          </p:cNvPr>
+          <p:cNvSpPr txBox="1"/>
+          <p:nvPr/>
+        </p:nvSpPr>
+        <p:spPr>
+          <a:xfrm>
             <a:off x="2091812" y="2321004"/>
             <a:ext cx="8008375" cy="1107996"/>
           </a:xfrm>
@@ -3383,7 +3467,7 @@
 </p:sld>
 </file>
 
-<file path=ppt/slides/slide2.xml><?xml version="1.0" encoding="utf-8"?>
+<file path=ppt/slides/slide3.xml><?xml version="1.0" encoding="utf-8"?>
 <p:sld xmlns:a="http://schemas.openxmlformats.org/drawingml/2006/main" xmlns:r="http://schemas.openxmlformats.org/officeDocument/2006/relationships" xmlns:p="http://schemas.openxmlformats.org/presentationml/2006/main">
   <p:cSld>
     <p:bg>

</xml_diff>